<commit_message>
HRF mass shooting, terrorist attack
</commit_message>
<xml_diff>
--- a/hrf/mass_shooting.pptx
+++ b/hrf/mass_shooting.pptx
@@ -6384,7 +6384,7 @@
             </a:pPr>
             <a:r>
               <a:rPr lang="en"/>
-              <a:t>Motive</a:t>
+              <a:t>Motive (10296)</a:t>
             </a:r>
             <a:endParaRPr/>
           </a:p>
@@ -6424,7 +6424,7 @@
             </a:pPr>
             <a:r>
               <a:rPr b="1" lang="en"/>
-              <a:t>Failure</a:t>
+              <a:t>Failure (10303)</a:t>
             </a:r>
             <a:r>
               <a:rPr lang="en"/>
@@ -6444,7 +6444,7 @@
             </a:pPr>
             <a:r>
               <a:rPr b="1" lang="en"/>
-              <a:t>Social conflict</a:t>
+              <a:t>Social conflict (10301)</a:t>
             </a:r>
             <a:r>
               <a:rPr lang="en"/>
@@ -6464,7 +6464,7 @@
             </a:pPr>
             <a:r>
               <a:rPr b="1" lang="en"/>
-              <a:t>Revenge</a:t>
+              <a:t>Revenge (10302)</a:t>
             </a:r>
             <a:r>
               <a:rPr lang="en"/>
@@ -6561,7 +6561,7 @@
             </a:pPr>
             <a:r>
               <a:rPr lang="en"/>
-              <a:t>Planning</a:t>
+              <a:t>Planning (10297)</a:t>
             </a:r>
             <a:endParaRPr/>
           </a:p>
@@ -6601,7 +6601,7 @@
             </a:pPr>
             <a:r>
               <a:rPr b="1" lang="en"/>
-              <a:t>Intentional human activity</a:t>
+              <a:t>Intentional human activity (10304)</a:t>
             </a:r>
             <a:r>
               <a:rPr lang="en"/>
@@ -6621,7 +6621,7 @@
             </a:pPr>
             <a:r>
               <a:rPr b="1" lang="en"/>
-              <a:t>Decision</a:t>
+              <a:t>Decision (10305)</a:t>
             </a:r>
             <a:r>
               <a:rPr lang="en"/>
@@ -6641,7 +6641,7 @@
             </a:pPr>
             <a:r>
               <a:rPr b="1" lang="en"/>
-              <a:t>Buy</a:t>
+              <a:t>Buy (10306)</a:t>
             </a:r>
             <a:r>
               <a:rPr lang="en"/>
@@ -6661,7 +6661,7 @@
             </a:pPr>
             <a:r>
               <a:rPr b="1" lang="en"/>
-              <a:t>Announcement</a:t>
+              <a:t>Announcement (10307)</a:t>
             </a:r>
             <a:r>
               <a:rPr lang="en"/>
@@ -6758,7 +6758,7 @@
             </a:pPr>
             <a:r>
               <a:rPr lang="en"/>
-              <a:t>Attack</a:t>
+              <a:t>Attack (10298)</a:t>
             </a:r>
             <a:endParaRPr/>
           </a:p>
@@ -6783,7 +6783,7 @@
         </p:spPr>
         <p:txBody>
           <a:bodyPr anchorCtr="0" anchor="t" bIns="91425" lIns="91425" spcFirstLastPara="1" rIns="91425" wrap="square" tIns="91425">
-            <a:normAutofit fontScale="92500" lnSpcReduction="20000"/>
+            <a:normAutofit fontScale="85000" lnSpcReduction="10000"/>
           </a:bodyPr>
           <a:lstStyle/>
           <a:p>
@@ -6798,7 +6798,7 @@
             </a:pPr>
             <a:r>
               <a:rPr b="1" lang="en"/>
-              <a:t>Motion</a:t>
+              <a:t>Motion (10308)</a:t>
             </a:r>
             <a:r>
               <a:rPr lang="en"/>
@@ -6818,7 +6818,7 @@
             </a:pPr>
             <a:r>
               <a:rPr b="1" lang="en"/>
-              <a:t>Gun violence</a:t>
+              <a:t>Gun violence (10309)</a:t>
             </a:r>
             <a:r>
               <a:rPr lang="en"/>
@@ -6838,7 +6838,7 @@
             </a:pPr>
             <a:r>
               <a:rPr b="1" lang="en"/>
-              <a:t>Injury</a:t>
+              <a:t>Injury (10312)</a:t>
             </a:r>
             <a:r>
               <a:rPr lang="en"/>
@@ -6858,7 +6858,7 @@
             </a:pPr>
             <a:r>
               <a:rPr b="1" lang="en"/>
-              <a:t>Killing</a:t>
+              <a:t>Killing (10311)</a:t>
             </a:r>
             <a:r>
               <a:rPr lang="en"/>
@@ -6878,7 +6878,7 @@
             </a:pPr>
             <a:r>
               <a:rPr b="1" lang="en"/>
-              <a:t>Survival</a:t>
+              <a:t>Survival (10313)</a:t>
             </a:r>
             <a:r>
               <a:rPr lang="en"/>
@@ -6898,7 +6898,7 @@
             </a:pPr>
             <a:r>
               <a:rPr b="1" lang="en"/>
-              <a:t>Violent death</a:t>
+              <a:t>Violent death (10310)</a:t>
             </a:r>
             <a:r>
               <a:rPr lang="en"/>
@@ -6972,7 +6972,7 @@
         <p:spPr>
           <a:xfrm>
             <a:off x="311700" y="555600"/>
-            <a:ext cx="2808000" cy="755700"/>
+            <a:ext cx="3654900" cy="755700"/>
           </a:xfrm>
           <a:prstGeom prst="rect">
             <a:avLst/>
@@ -6980,7 +6980,7 @@
         </p:spPr>
         <p:txBody>
           <a:bodyPr anchorCtr="0" anchor="b" bIns="91425" lIns="91425" spcFirstLastPara="1" rIns="91425" wrap="square" tIns="91425">
-            <a:normAutofit/>
+            <a:normAutofit fontScale="90000"/>
           </a:bodyPr>
           <a:lstStyle/>
           <a:p>
@@ -6995,7 +6995,7 @@
             </a:pPr>
             <a:r>
               <a:rPr lang="en"/>
-              <a:t>Medical Response</a:t>
+              <a:t>Medical Response (10299)</a:t>
             </a:r>
             <a:endParaRPr/>
           </a:p>
@@ -7020,7 +7020,7 @@
         </p:spPr>
         <p:txBody>
           <a:bodyPr anchorCtr="0" anchor="t" bIns="91425" lIns="91425" spcFirstLastPara="1" rIns="91425" wrap="square" tIns="91425">
-            <a:normAutofit/>
+            <a:normAutofit lnSpcReduction="10000"/>
           </a:bodyPr>
           <a:lstStyle/>
           <a:p>
@@ -7035,7 +7035,7 @@
             </a:pPr>
             <a:r>
               <a:rPr b="1" lang="en"/>
-              <a:t>Emergency call</a:t>
+              <a:t>Emergency call (10314)</a:t>
             </a:r>
             <a:r>
               <a:rPr lang="en"/>
@@ -7055,7 +7055,7 @@
             </a:pPr>
             <a:r>
               <a:rPr b="1" lang="en"/>
-              <a:t>Driving</a:t>
+              <a:t>Driving (10315)</a:t>
             </a:r>
             <a:r>
               <a:rPr lang="en"/>
@@ -7075,7 +7075,7 @@
             </a:pPr>
             <a:r>
               <a:rPr b="1" lang="en"/>
-              <a:t>First aid</a:t>
+              <a:t>First aid (10316)</a:t>
             </a:r>
             <a:r>
               <a:rPr lang="en"/>
@@ -7095,7 +7095,7 @@
             </a:pPr>
             <a:r>
               <a:rPr b="1" lang="en"/>
-              <a:t>Rescue</a:t>
+              <a:t>Rescue (10317)</a:t>
             </a:r>
             <a:r>
               <a:rPr lang="en"/>
@@ -7169,7 +7169,7 @@
         <p:spPr>
           <a:xfrm>
             <a:off x="311700" y="-87800"/>
-            <a:ext cx="2808000" cy="755700"/>
+            <a:ext cx="4867200" cy="755700"/>
           </a:xfrm>
           <a:prstGeom prst="rect">
             <a:avLst/>
@@ -7177,7 +7177,7 @@
         </p:spPr>
         <p:txBody>
           <a:bodyPr anchorCtr="0" anchor="b" bIns="91425" lIns="91425" spcFirstLastPara="1" rIns="91425" wrap="square" tIns="91425">
-            <a:normAutofit fontScale="90000"/>
+            <a:normAutofit/>
           </a:bodyPr>
           <a:lstStyle/>
           <a:p>
@@ -7192,7 +7192,7 @@
             </a:pPr>
             <a:r>
               <a:rPr lang="en"/>
-              <a:t>Criminal Investigation</a:t>
+              <a:t>Criminal Investigation (10300)</a:t>
             </a:r>
             <a:endParaRPr/>
           </a:p>
@@ -7217,7 +7217,7 @@
         </p:spPr>
         <p:txBody>
           <a:bodyPr anchorCtr="0" anchor="t" bIns="91425" lIns="91425" spcFirstLastPara="1" rIns="91425" wrap="square" tIns="91425">
-            <a:normAutofit/>
+            <a:normAutofit lnSpcReduction="10000"/>
           </a:bodyPr>
           <a:lstStyle/>
           <a:p>
@@ -7236,7 +7236,7 @@
             </a:pPr>
             <a:r>
               <a:rPr b="1" lang="en" sz="820"/>
-              <a:t>Accusation</a:t>
+              <a:t>Accusation (10318)</a:t>
             </a:r>
             <a:r>
               <a:rPr lang="en" sz="820"/>
@@ -7260,7 +7260,7 @@
             </a:pPr>
             <a:r>
               <a:rPr b="1" lang="en" sz="820"/>
-              <a:t>Arrest</a:t>
+              <a:t>Arrest (10319)</a:t>
             </a:r>
             <a:r>
               <a:rPr lang="en" sz="820"/>
@@ -7292,7 +7292,7 @@
             </a:pPr>
             <a:r>
               <a:rPr b="1" lang="en" sz="820"/>
-              <a:t>Detention</a:t>
+              <a:t>Detention (10320)</a:t>
             </a:r>
             <a:r>
               <a:rPr lang="en" sz="820"/>
@@ -7316,7 +7316,7 @@
             </a:pPr>
             <a:r>
               <a:rPr b="1" lang="en" sz="820"/>
-              <a:t>Conviction</a:t>
+              <a:t>Conviction (10321)</a:t>
             </a:r>
             <a:r>
               <a:rPr lang="en" sz="820"/>
@@ -7340,7 +7340,7 @@
             </a:pPr>
             <a:r>
               <a:rPr b="1" lang="en" sz="820"/>
-              <a:t>Plea</a:t>
+              <a:t>Plea (10322)</a:t>
             </a:r>
             <a:r>
               <a:rPr lang="en" sz="820"/>
@@ -7364,7 +7364,7 @@
             </a:pPr>
             <a:r>
               <a:rPr b="1" lang="en" sz="820"/>
-              <a:t>Trial</a:t>
+              <a:t>Trial (10323)</a:t>
             </a:r>
             <a:r>
               <a:rPr lang="en" sz="820"/>
@@ -7439,7 +7439,7 @@
             </a:pPr>
             <a:r>
               <a:rPr b="1" lang="en" sz="800"/>
-              <a:t>Legal hearing</a:t>
+              <a:t>Legal hearing (10324)</a:t>
             </a:r>
             <a:r>
               <a:rPr lang="en" sz="800"/>
@@ -7462,7 +7462,7 @@
             </a:pPr>
             <a:r>
               <a:rPr b="1" lang="en" sz="800"/>
-              <a:t>Court decision</a:t>
+              <a:t>Court decision (10325)</a:t>
             </a:r>
             <a:r>
               <a:rPr lang="en" sz="800"/>
@@ -7485,7 +7485,7 @@
             </a:pPr>
             <a:r>
               <a:rPr b="1" lang="en" sz="800"/>
-              <a:t>Acquittal</a:t>
+              <a:t>Acquittal (10327)</a:t>
             </a:r>
             <a:r>
               <a:rPr lang="en" sz="800"/>
@@ -7508,7 +7508,7 @@
             </a:pPr>
             <a:r>
               <a:rPr b="1" lang="en" sz="800"/>
-              <a:t>Sentence</a:t>
+              <a:t>Sentence (10326)</a:t>
             </a:r>
             <a:r>
               <a:rPr lang="en" sz="800"/>
@@ -7531,7 +7531,7 @@
             </a:pPr>
             <a:r>
               <a:rPr b="1" lang="en" sz="800"/>
-              <a:t>Imprisonment</a:t>
+              <a:t>Imprisonment (10328)</a:t>
             </a:r>
             <a:r>
               <a:rPr lang="en" sz="800"/>
@@ -7554,7 +7554,7 @@
             </a:pPr>
             <a:r>
               <a:rPr b="1" lang="en" sz="800"/>
-              <a:t>Execution</a:t>
+              <a:t>Execution (10329)</a:t>
             </a:r>
             <a:r>
               <a:rPr lang="en" sz="800"/>

</xml_diff>